<commit_message>
new modified files after interview
</commit_message>
<xml_diff>
--- a/vb_net/L2 Using Procedures.pptx
+++ b/vb_net/L2 Using Procedures.pptx
@@ -349,7 +349,7 @@
           <a:p>
             <a:fld id="{11EAACC7-3B3F-47D1-959A-EF58926E955E}" type="datetimeFigureOut">
               <a:rPr lang="en-US" smtClean="0"/>
-              <a:t>8/2/2021</a:t>
+              <a:t>12/28/2021</a:t>
             </a:fld>
             <a:endParaRPr lang="en-US"/>
           </a:p>
@@ -687,7 +687,7 @@
           <a:p>
             <a:fld id="{11EAACC7-3B3F-47D1-959A-EF58926E955E}" type="datetimeFigureOut">
               <a:rPr lang="en-US" smtClean="0"/>
-              <a:t>8/2/2021</a:t>
+              <a:t>12/28/2021</a:t>
             </a:fld>
             <a:endParaRPr lang="en-US"/>
           </a:p>
@@ -1088,7 +1088,7 @@
           <a:p>
             <a:fld id="{11EAACC7-3B3F-47D1-959A-EF58926E955E}" type="datetimeFigureOut">
               <a:rPr lang="en-US" smtClean="0"/>
-              <a:t>8/2/2021</a:t>
+              <a:t>12/28/2021</a:t>
             </a:fld>
             <a:endParaRPr lang="en-US"/>
           </a:p>
@@ -1424,7 +1424,7 @@
           <a:p>
             <a:fld id="{11EAACC7-3B3F-47D1-959A-EF58926E955E}" type="datetimeFigureOut">
               <a:rPr lang="en-US" smtClean="0"/>
-              <a:t>8/2/2021</a:t>
+              <a:t>12/28/2021</a:t>
             </a:fld>
             <a:endParaRPr lang="en-US"/>
           </a:p>
@@ -1744,7 +1744,7 @@
           <a:p>
             <a:fld id="{11EAACC7-3B3F-47D1-959A-EF58926E955E}" type="datetimeFigureOut">
               <a:rPr lang="en-US" smtClean="0"/>
-              <a:t>8/2/2021</a:t>
+              <a:t>12/28/2021</a:t>
             </a:fld>
             <a:endParaRPr lang="en-US"/>
           </a:p>
@@ -2140,7 +2140,7 @@
           <a:p>
             <a:fld id="{11EAACC7-3B3F-47D1-959A-EF58926E955E}" type="datetimeFigureOut">
               <a:rPr lang="en-US" smtClean="0"/>
-              <a:t>8/2/2021</a:t>
+              <a:t>12/28/2021</a:t>
             </a:fld>
             <a:endParaRPr lang="en-US"/>
           </a:p>
@@ -2397,7 +2397,7 @@
           <a:p>
             <a:fld id="{11EAACC7-3B3F-47D1-959A-EF58926E955E}" type="datetimeFigureOut">
               <a:rPr lang="en-US" smtClean="0"/>
-              <a:t>8/2/2021</a:t>
+              <a:t>12/28/2021</a:t>
             </a:fld>
             <a:endParaRPr lang="en-US"/>
           </a:p>
@@ -2659,7 +2659,7 @@
           <a:p>
             <a:fld id="{11EAACC7-3B3F-47D1-959A-EF58926E955E}" type="datetimeFigureOut">
               <a:rPr lang="en-US" smtClean="0"/>
-              <a:t>8/2/2021</a:t>
+              <a:t>12/28/2021</a:t>
             </a:fld>
             <a:endParaRPr lang="en-US"/>
           </a:p>
@@ -2921,7 +2921,7 @@
           <a:p>
             <a:fld id="{11EAACC7-3B3F-47D1-959A-EF58926E955E}" type="datetimeFigureOut">
               <a:rPr lang="en-US" smtClean="0"/>
-              <a:t>8/2/2021</a:t>
+              <a:t>12/28/2021</a:t>
             </a:fld>
             <a:endParaRPr lang="en-US" dirty="0"/>
           </a:p>
@@ -3250,7 +3250,7 @@
           <a:p>
             <a:fld id="{11EAACC7-3B3F-47D1-959A-EF58926E955E}" type="datetimeFigureOut">
               <a:rPr lang="en-US" smtClean="0"/>
-              <a:t>8/2/2021</a:t>
+              <a:t>12/28/2021</a:t>
             </a:fld>
             <a:endParaRPr lang="en-US"/>
           </a:p>
@@ -3573,7 +3573,7 @@
           <a:p>
             <a:fld id="{11EAACC7-3B3F-47D1-959A-EF58926E955E}" type="datetimeFigureOut">
               <a:rPr lang="en-US" smtClean="0"/>
-              <a:t>8/2/2021</a:t>
+              <a:t>12/28/2021</a:t>
             </a:fld>
             <a:endParaRPr lang="en-US"/>
           </a:p>
@@ -4030,7 +4030,7 @@
           <a:p>
             <a:fld id="{11EAACC7-3B3F-47D1-959A-EF58926E955E}" type="datetimeFigureOut">
               <a:rPr lang="en-US" smtClean="0"/>
-              <a:t>8/2/2021</a:t>
+              <a:t>12/28/2021</a:t>
             </a:fld>
             <a:endParaRPr lang="en-US"/>
           </a:p>
@@ -4235,7 +4235,7 @@
           <a:p>
             <a:fld id="{11EAACC7-3B3F-47D1-959A-EF58926E955E}" type="datetimeFigureOut">
               <a:rPr lang="en-US" smtClean="0"/>
-              <a:t>8/2/2021</a:t>
+              <a:t>12/28/2021</a:t>
             </a:fld>
             <a:endParaRPr lang="en-US"/>
           </a:p>
@@ -4412,7 +4412,7 @@
           <a:p>
             <a:fld id="{11EAACC7-3B3F-47D1-959A-EF58926E955E}" type="datetimeFigureOut">
               <a:rPr lang="en-US" smtClean="0"/>
-              <a:t>8/2/2021</a:t>
+              <a:t>12/28/2021</a:t>
             </a:fld>
             <a:endParaRPr lang="en-US"/>
           </a:p>
@@ -4745,7 +4745,7 @@
           <a:p>
             <a:fld id="{11EAACC7-3B3F-47D1-959A-EF58926E955E}" type="datetimeFigureOut">
               <a:rPr lang="en-US" smtClean="0"/>
-              <a:t>8/2/2021</a:t>
+              <a:t>12/28/2021</a:t>
             </a:fld>
             <a:endParaRPr lang="en-US"/>
           </a:p>
@@ -5090,7 +5090,7 @@
           <a:p>
             <a:fld id="{11EAACC7-3B3F-47D1-959A-EF58926E955E}" type="datetimeFigureOut">
               <a:rPr lang="en-US" smtClean="0"/>
-              <a:t>8/2/2021</a:t>
+              <a:t>12/28/2021</a:t>
             </a:fld>
             <a:endParaRPr lang="en-US"/>
           </a:p>
@@ -7207,7 +7207,7 @@
           <a:p>
             <a:fld id="{11EAACC7-3B3F-47D1-959A-EF58926E955E}" type="datetimeFigureOut">
               <a:rPr lang="en-US" smtClean="0"/>
-              <a:t>8/2/2021</a:t>
+              <a:t>12/28/2021</a:t>
             </a:fld>
             <a:endParaRPr lang="en-US"/>
           </a:p>

</xml_diff>